<commit_message>
Added slide about chatbots evolution
</commit_message>
<xml_diff>
--- a/Natural Language Processing - Presentation.pptx
+++ b/Natural Language Processing - Presentation.pptx
@@ -32,7 +32,8 @@
     <p:sldId id="268" r:id="rId26"/>
     <p:sldId id="265" r:id="rId27"/>
     <p:sldId id="262" r:id="rId28"/>
-    <p:sldId id="270" r:id="rId29"/>
+    <p:sldId id="294" r:id="rId29"/>
+    <p:sldId id="270" r:id="rId30"/>
   </p:sldIdLst>
   <p:sldSz cx="12192000" cy="6858000"/>
   <p:notesSz cx="6858000" cy="9144000"/>
@@ -286,7 +287,7 @@
           <a:p>
             <a:fld id="{B2E3C0E7-0818-41FA-877E-0B361FCDEA20}" type="datetimeFigureOut">
               <a:rPr lang="en-US" smtClean="0"/>
-              <a:t>6/2/2020</a:t>
+              <a:t>6/3/2020</a:t>
             </a:fld>
             <a:endParaRPr lang="en-US"/>
           </a:p>
@@ -484,7 +485,7 @@
           <a:p>
             <a:fld id="{B2E3C0E7-0818-41FA-877E-0B361FCDEA20}" type="datetimeFigureOut">
               <a:rPr lang="en-US" smtClean="0"/>
-              <a:t>6/2/2020</a:t>
+              <a:t>6/3/2020</a:t>
             </a:fld>
             <a:endParaRPr lang="en-US"/>
           </a:p>
@@ -692,7 +693,7 @@
           <a:p>
             <a:fld id="{B2E3C0E7-0818-41FA-877E-0B361FCDEA20}" type="datetimeFigureOut">
               <a:rPr lang="en-US" smtClean="0"/>
-              <a:t>6/2/2020</a:t>
+              <a:t>6/3/2020</a:t>
             </a:fld>
             <a:endParaRPr lang="en-US"/>
           </a:p>
@@ -890,7 +891,7 @@
           <a:p>
             <a:fld id="{B2E3C0E7-0818-41FA-877E-0B361FCDEA20}" type="datetimeFigureOut">
               <a:rPr lang="en-US" smtClean="0"/>
-              <a:t>6/2/2020</a:t>
+              <a:t>6/3/2020</a:t>
             </a:fld>
             <a:endParaRPr lang="en-US"/>
           </a:p>
@@ -1165,7 +1166,7 @@
           <a:p>
             <a:fld id="{B2E3C0E7-0818-41FA-877E-0B361FCDEA20}" type="datetimeFigureOut">
               <a:rPr lang="en-US" smtClean="0"/>
-              <a:t>6/2/2020</a:t>
+              <a:t>6/3/2020</a:t>
             </a:fld>
             <a:endParaRPr lang="en-US"/>
           </a:p>
@@ -1430,7 +1431,7 @@
           <a:p>
             <a:fld id="{B2E3C0E7-0818-41FA-877E-0B361FCDEA20}" type="datetimeFigureOut">
               <a:rPr lang="en-US" smtClean="0"/>
-              <a:t>6/2/2020</a:t>
+              <a:t>6/3/2020</a:t>
             </a:fld>
             <a:endParaRPr lang="en-US"/>
           </a:p>
@@ -1842,7 +1843,7 @@
           <a:p>
             <a:fld id="{B2E3C0E7-0818-41FA-877E-0B361FCDEA20}" type="datetimeFigureOut">
               <a:rPr lang="en-US" smtClean="0"/>
-              <a:t>6/2/2020</a:t>
+              <a:t>6/3/2020</a:t>
             </a:fld>
             <a:endParaRPr lang="en-US"/>
           </a:p>
@@ -1983,7 +1984,7 @@
           <a:p>
             <a:fld id="{B2E3C0E7-0818-41FA-877E-0B361FCDEA20}" type="datetimeFigureOut">
               <a:rPr lang="en-US" smtClean="0"/>
-              <a:t>6/2/2020</a:t>
+              <a:t>6/3/2020</a:t>
             </a:fld>
             <a:endParaRPr lang="en-US"/>
           </a:p>
@@ -2096,7 +2097,7 @@
           <a:p>
             <a:fld id="{B2E3C0E7-0818-41FA-877E-0B361FCDEA20}" type="datetimeFigureOut">
               <a:rPr lang="en-US" smtClean="0"/>
-              <a:t>6/2/2020</a:t>
+              <a:t>6/3/2020</a:t>
             </a:fld>
             <a:endParaRPr lang="en-US"/>
           </a:p>
@@ -2407,7 +2408,7 @@
           <a:p>
             <a:fld id="{B2E3C0E7-0818-41FA-877E-0B361FCDEA20}" type="datetimeFigureOut">
               <a:rPr lang="en-US" smtClean="0"/>
-              <a:t>6/2/2020</a:t>
+              <a:t>6/3/2020</a:t>
             </a:fld>
             <a:endParaRPr lang="en-US"/>
           </a:p>
@@ -2695,7 +2696,7 @@
           <a:p>
             <a:fld id="{B2E3C0E7-0818-41FA-877E-0B361FCDEA20}" type="datetimeFigureOut">
               <a:rPr lang="en-US" smtClean="0"/>
-              <a:t>6/2/2020</a:t>
+              <a:t>6/3/2020</a:t>
             </a:fld>
             <a:endParaRPr lang="en-US"/>
           </a:p>
@@ -2936,7 +2937,7 @@
           <a:p>
             <a:fld id="{B2E3C0E7-0818-41FA-877E-0B361FCDEA20}" type="datetimeFigureOut">
               <a:rPr lang="en-US" smtClean="0"/>
-              <a:t>6/2/2020</a:t>
+              <a:t>6/3/2020</a:t>
             </a:fld>
             <a:endParaRPr lang="en-US"/>
           </a:p>
@@ -3568,7 +3569,7 @@
           <a:p>
             <a:r>
               <a:rPr lang="en-US" dirty="0"/>
-              <a:t>have a neural network (NN) learn good vector representations of words that have some desirable properties like being </a:t>
+              <a:t>a neural network (NN) can “learn” good vector representations of words that have some desirable properties like being </a:t>
             </a:r>
             <a:r>
               <a:rPr lang="en-US" b="1" i="1" dirty="0"/>
@@ -3596,7 +3597,15 @@
           <a:p>
             <a:r>
               <a:rPr lang="en-US" dirty="0"/>
-              <a:t>next step is to get a vectorization for a whole sentence instead of just a single word, which is very useful if you want to do text classification for example.</a:t>
+              <a:t>next step is to get a </a:t>
+            </a:r>
+            <a:r>
+              <a:rPr lang="en-US" i="1" dirty="0"/>
+              <a:t>vectorization for a whole sentence </a:t>
+            </a:r>
+            <a:r>
+              <a:rPr lang="en-US" dirty="0"/>
+              <a:t>instead of just a single word, which is very useful if you want to do text classification for example.</a:t>
             </a:r>
           </a:p>
         </p:txBody>
@@ -6192,7 +6201,7 @@
             </a:r>
             <a:r>
               <a:rPr lang="en-US" b="1" dirty="0"/>
-              <a:t>verbs</a:t>
+              <a:t>verbs </a:t>
             </a:r>
             <a:r>
               <a:rPr lang="en-US" dirty="0"/>
@@ -6240,7 +6249,7 @@
             <a:pPr lvl="1"/>
             <a:r>
               <a:rPr lang="en-US" dirty="0"/>
-              <a:t>It is possible to have multiple intents(like checking the weather, checking ground available, checking friends availability) for a single entity playing and also multiple entities for intent and multiple intents for multiple entities.</a:t>
+              <a:t>It is possible to have multiple intents (like checking the weather, checking ground available, checking friends availability) for a single entity playing and also multiple entities for intent and multiple intents for multiple entities.</a:t>
             </a:r>
           </a:p>
           <a:p>
@@ -6581,6 +6590,102 @@
           <p:cNvPr id="2" name="Title 1">
             <a:extLst>
               <a:ext uri="{FF2B5EF4-FFF2-40B4-BE49-F238E27FC236}">
+                <a16:creationId xmlns:a16="http://schemas.microsoft.com/office/drawing/2014/main" id="{EAE6326A-752C-4C6D-A062-3FC6C44058EE}"/>
+              </a:ext>
+            </a:extLst>
+          </p:cNvPr>
+          <p:cNvSpPr>
+            <a:spLocks noGrp="1"/>
+          </p:cNvSpPr>
+          <p:nvPr>
+            <p:ph type="title"/>
+          </p:nvPr>
+        </p:nvSpPr>
+        <p:spPr>
+          <a:xfrm>
+            <a:off x="838200" y="365126"/>
+            <a:ext cx="10515600" cy="527759"/>
+          </a:xfrm>
+        </p:spPr>
+        <p:txBody>
+          <a:bodyPr>
+            <a:normAutofit fontScale="90000"/>
+          </a:bodyPr>
+          <a:lstStyle/>
+          <a:p>
+            <a:pPr algn="ctr"/>
+            <a:r>
+              <a:rPr lang="en-US" sz="4000" dirty="0"/>
+              <a:t>Evolution of bots</a:t>
+            </a:r>
+          </a:p>
+        </p:txBody>
+      </p:sp>
+      <p:pic>
+        <p:nvPicPr>
+          <p:cNvPr id="6" name="Picture 5">
+            <a:extLst>
+              <a:ext uri="{FF2B5EF4-FFF2-40B4-BE49-F238E27FC236}">
+                <a16:creationId xmlns:a16="http://schemas.microsoft.com/office/drawing/2014/main" id="{88972BF8-405B-4A20-B981-6837CA849FB9}"/>
+              </a:ext>
+            </a:extLst>
+          </p:cNvPr>
+          <p:cNvPicPr>
+            <a:picLocks noChangeAspect="1"/>
+          </p:cNvPicPr>
+          <p:nvPr/>
+        </p:nvPicPr>
+        <p:blipFill>
+          <a:blip r:embed="rId2"/>
+          <a:stretch>
+            <a:fillRect/>
+          </a:stretch>
+        </p:blipFill>
+        <p:spPr>
+          <a:xfrm>
+            <a:off x="1757362" y="1271587"/>
+            <a:ext cx="9317550" cy="4957763"/>
+          </a:xfrm>
+          <a:prstGeom prst="rect">
+            <a:avLst/>
+          </a:prstGeom>
+        </p:spPr>
+      </p:pic>
+    </p:spTree>
+    <p:extLst>
+      <p:ext uri="{BB962C8B-B14F-4D97-AF65-F5344CB8AC3E}">
+        <p14:creationId xmlns:p14="http://schemas.microsoft.com/office/powerpoint/2010/main" val="4245905578"/>
+      </p:ext>
+    </p:extLst>
+  </p:cSld>
+  <p:clrMapOvr>
+    <a:masterClrMapping/>
+  </p:clrMapOvr>
+</p:sld>
+</file>
+
+<file path=ppt/slides/slide29.xml><?xml version="1.0" encoding="utf-8"?>
+<p:sld xmlns:a="http://schemas.openxmlformats.org/drawingml/2006/main" xmlns:r="http://schemas.openxmlformats.org/officeDocument/2006/relationships" xmlns:p="http://schemas.openxmlformats.org/presentationml/2006/main">
+  <p:cSld>
+    <p:spTree>
+      <p:nvGrpSpPr>
+        <p:cNvPr id="1" name=""/>
+        <p:cNvGrpSpPr/>
+        <p:nvPr/>
+      </p:nvGrpSpPr>
+      <p:grpSpPr>
+        <a:xfrm>
+          <a:off x="0" y="0"/>
+          <a:ext cx="0" cy="0"/>
+          <a:chOff x="0" y="0"/>
+          <a:chExt cx="0" cy="0"/>
+        </a:xfrm>
+      </p:grpSpPr>
+      <p:sp>
+        <p:nvSpPr>
+          <p:cNvPr id="2" name="Title 1">
+            <a:extLst>
+              <a:ext uri="{FF2B5EF4-FFF2-40B4-BE49-F238E27FC236}">
                 <a16:creationId xmlns:a16="http://schemas.microsoft.com/office/drawing/2014/main" id="{9BEDF714-A3F4-4773-AEFD-C3733C4056D0}"/>
               </a:ext>
             </a:extLst>
@@ -7060,7 +7165,23 @@
           <a:p>
             <a:r>
               <a:rPr lang="en-US" dirty="0"/>
-              <a:t>combines the power of linguistics and computer science to study the rules and structure of language</a:t>
+              <a:t>combines the power of </a:t>
+            </a:r>
+            <a:r>
+              <a:rPr lang="en-US" i="1" dirty="0"/>
+              <a:t>linguistics</a:t>
+            </a:r>
+            <a:r>
+              <a:rPr lang="en-US" dirty="0"/>
+              <a:t> and </a:t>
+            </a:r>
+            <a:r>
+              <a:rPr lang="en-US" i="1" dirty="0"/>
+              <a:t>computer science </a:t>
+            </a:r>
+            <a:r>
+              <a:rPr lang="en-US" dirty="0"/>
+              <a:t>to study the rules and structure of language</a:t>
             </a:r>
           </a:p>
           <a:p>
@@ -7604,7 +7725,11 @@
             <a:pPr lvl="1"/>
             <a:r>
               <a:rPr lang="en-US" dirty="0"/>
-              <a:t>studies the grammatical rules in natural language with the purpose of uncovering the structure of a text</a:t>
+              <a:t>studies the grammatical rules in natural language with the purpose of uncovering the </a:t>
+            </a:r>
+            <a:r>
+              <a:rPr lang="en-US" i="1" dirty="0"/>
+              <a:t>structure of a text</a:t>
             </a:r>
           </a:p>
           <a:p>
@@ -7617,7 +7742,11 @@
             <a:pPr lvl="1"/>
             <a:r>
               <a:rPr lang="en-US" dirty="0"/>
-              <a:t>focuses on identifying the meaning of text</a:t>
+              <a:t>focuses on identifying the </a:t>
+            </a:r>
+            <a:r>
+              <a:rPr lang="en-US" i="1" dirty="0"/>
+              <a:t>meaning of text</a:t>
             </a:r>
           </a:p>
           <a:p>

</xml_diff>